<commit_message>
[MT M] Revisioni alla presentazione di Mariella
</commit_message>
<xml_diff>
--- a/Presentazione/Atsilo2/Ferrara/Ferrara_M_PresentazioneFinale.pptx
+++ b/Presentazione/Atsilo2/Ferrara/Ferrara_M_PresentazioneFinale.pptx
@@ -122,6 +122,51 @@
 </p:presentation>
 </file>
 
+<file path=ppt/commentAuthors.xml><?xml version="1.0" encoding="utf-8"?>
+<p:cmAuthorLst xmlns:a="http://schemas.openxmlformats.org/drawingml/2006/main" xmlns:r="http://schemas.openxmlformats.org/officeDocument/2006/relationships" xmlns:p="http://schemas.openxmlformats.org/presentationml/2006/main">
+  <p:cmAuthor id="0" name="Giulio" initials="GF" lastIdx="4" clrIdx="0"/>
+</p:cmAuthorLst>
+</file>
+
+<file path=ppt/comments/comment1.xml><?xml version="1.0" encoding="utf-8"?>
+<p:cmLst xmlns:a="http://schemas.openxmlformats.org/drawingml/2006/main" xmlns:r="http://schemas.openxmlformats.org/officeDocument/2006/relationships" xmlns:p="http://schemas.openxmlformats.org/presentationml/2006/main">
+  <p:cm authorId="0" dt="2012-12-30T14:02:43.578" idx="1">
+    <p:pos x="10" y="10"/>
+    <p:text>Io partirei subito coi disegni. Li puoi affiancare al testo, come già hai fatto nella slide 3.
+E' vero che mettere il disegno rende poi il testo meno leggibile, però un disegno ben fatto riesce a dare subito l'idea di ciò che il testo spiega.</p:text>
+  </p:cm>
+</p:cmLst>
+</file>
+
+<file path=ppt/comments/comment2.xml><?xml version="1.0" encoding="utf-8"?>
+<p:cmLst xmlns:a="http://schemas.openxmlformats.org/drawingml/2006/main" xmlns:r="http://schemas.openxmlformats.org/officeDocument/2006/relationships" xmlns:p="http://schemas.openxmlformats.org/presentationml/2006/main">
+  <p:cm authorId="0" dt="2012-12-30T14:06:06.480" idx="2">
+    <p:pos x="10" y="19"/>
+    <p:text>Eppeffortuna che l'hai fatta di fretta col sonno.. :3
+L'unica cosa è che dovresti cercare di usare la stessa grafica su tutte le slide. Qui hai usato un contorno stondato, con ombra azzurra, mentre prima hai colorato i bordi dei sottosistemi di blu. Prima ancora, invece, hai usato una linea blu prussia spessa.</p:text>
+  </p:cm>
+</p:cmLst>
+</file>
+
+<file path=ppt/comments/comment3.xml><?xml version="1.0" encoding="utf-8"?>
+<p:cmLst xmlns:a="http://schemas.openxmlformats.org/drawingml/2006/main" xmlns:r="http://schemas.openxmlformats.org/officeDocument/2006/relationships" xmlns:p="http://schemas.openxmlformats.org/presentationml/2006/main">
+  <p:cm authorId="0" dt="2012-12-30T14:30:17.172" idx="3">
+    <p:pos x="5427" y="1249"/>
+    <p:text>Non so se è questa la def. che piace alla prof (il corso lo avete fatto voi, quindi lo sapete voi.
+Una definizione alternativa del testing è che lo scopo è di trovare difetti nel software.</p:text>
+  </p:cm>
+</p:cmLst>
+</file>
+
+<file path=ppt/comments/comment4.xml><?xml version="1.0" encoding="utf-8"?>
+<p:cmLst xmlns:a="http://schemas.openxmlformats.org/drawingml/2006/main" xmlns:r="http://schemas.openxmlformats.org/officeDocument/2006/relationships" xmlns:p="http://schemas.openxmlformats.org/presentationml/2006/main">
+  <p:cm authorId="0" dt="2012-12-30T14:31:33.442" idx="4">
+    <p:pos x="10" y="10"/>
+    <p:text>Qui si potrebbe mettere un esempio di incongruenza, però il rischio è cadere nello sputtanamento di Kids, che non so se alla prof va bene.</p:text>
+  </p:cm>
+</p:cmLst>
+</file>
+
 <file path=ppt/notesMasters/notesMaster1.xml><?xml version="1.0" encoding="utf-8"?>
 <p:notesMaster xmlns:a="http://schemas.openxmlformats.org/drawingml/2006/main" xmlns:r="http://schemas.openxmlformats.org/officeDocument/2006/relationships" xmlns:p="http://schemas.openxmlformats.org/presentationml/2006/main">
   <p:cSld>
@@ -205,7 +250,7 @@
             <a:fld id="{38D78F4D-402C-46E0-A4BB-DF91EA86B14C}" type="datetimeFigureOut">
               <a:rPr lang="it-IT" smtClean="0"/>
               <a:pPr/>
-              <a:t>28/12/2012</a:t>
+              <a:t>30/12/2012</a:t>
             </a:fld>
             <a:endParaRPr lang="it-IT"/>
           </a:p>
@@ -374,7 +419,7 @@
     </p:spTree>
     <p:extLst>
       <p:ext uri="{BB962C8B-B14F-4D97-AF65-F5344CB8AC3E}">
-        <p14:creationId xmlns:p14="http://schemas.microsoft.com/office/powerpoint/2010/main" xmlns="" val="2126419590"/>
+        <p14:creationId xmlns="" xmlns:p14="http://schemas.microsoft.com/office/powerpoint/2010/main" val="2126419590"/>
       </p:ext>
     </p:extLst>
   </p:cSld>
@@ -722,7 +767,7 @@
             <a:fld id="{63CABBC0-75E4-43BB-A6A6-84C2A96BDB82}" type="datetimeFigureOut">
               <a:rPr lang="it-IT" smtClean="0"/>
               <a:pPr/>
-              <a:t>28/12/2012</a:t>
+              <a:t>30/12/2012</a:t>
             </a:fld>
             <a:endParaRPr lang="it-IT"/>
           </a:p>
@@ -904,7 +949,7 @@
             <a:fld id="{63CABBC0-75E4-43BB-A6A6-84C2A96BDB82}" type="datetimeFigureOut">
               <a:rPr lang="it-IT" smtClean="0"/>
               <a:pPr/>
-              <a:t>28/12/2012</a:t>
+              <a:t>30/12/2012</a:t>
             </a:fld>
             <a:endParaRPr lang="it-IT"/>
           </a:p>
@@ -1096,7 +1141,7 @@
             <a:fld id="{63CABBC0-75E4-43BB-A6A6-84C2A96BDB82}" type="datetimeFigureOut">
               <a:rPr lang="it-IT" smtClean="0"/>
               <a:pPr/>
-              <a:t>28/12/2012</a:t>
+              <a:t>30/12/2012</a:t>
             </a:fld>
             <a:endParaRPr lang="it-IT"/>
           </a:p>
@@ -1278,7 +1323,7 @@
             <a:fld id="{63CABBC0-75E4-43BB-A6A6-84C2A96BDB82}" type="datetimeFigureOut">
               <a:rPr lang="it-IT" smtClean="0"/>
               <a:pPr/>
-              <a:t>28/12/2012</a:t>
+              <a:t>30/12/2012</a:t>
             </a:fld>
             <a:endParaRPr lang="it-IT"/>
           </a:p>
@@ -1521,7 +1566,7 @@
             <a:fld id="{63CABBC0-75E4-43BB-A6A6-84C2A96BDB82}" type="datetimeFigureOut">
               <a:rPr lang="it-IT" smtClean="0"/>
               <a:pPr/>
-              <a:t>28/12/2012</a:t>
+              <a:t>30/12/2012</a:t>
             </a:fld>
             <a:endParaRPr lang="it-IT"/>
           </a:p>
@@ -1802,7 +1847,7 @@
             <a:fld id="{63CABBC0-75E4-43BB-A6A6-84C2A96BDB82}" type="datetimeFigureOut">
               <a:rPr lang="it-IT" smtClean="0"/>
               <a:pPr/>
-              <a:t>28/12/2012</a:t>
+              <a:t>30/12/2012</a:t>
             </a:fld>
             <a:endParaRPr lang="it-IT"/>
           </a:p>
@@ -2193,7 +2238,7 @@
             <a:fld id="{63CABBC0-75E4-43BB-A6A6-84C2A96BDB82}" type="datetimeFigureOut">
               <a:rPr lang="it-IT" smtClean="0"/>
               <a:pPr/>
-              <a:t>28/12/2012</a:t>
+              <a:t>30/12/2012</a:t>
             </a:fld>
             <a:endParaRPr lang="it-IT"/>
           </a:p>
@@ -2352,7 +2397,7 @@
             <a:fld id="{63CABBC0-75E4-43BB-A6A6-84C2A96BDB82}" type="datetimeFigureOut">
               <a:rPr lang="it-IT" smtClean="0"/>
               <a:pPr/>
-              <a:t>28/12/2012</a:t>
+              <a:t>30/12/2012</a:t>
             </a:fld>
             <a:endParaRPr lang="it-IT"/>
           </a:p>
@@ -2451,7 +2496,7 @@
             <a:fld id="{63CABBC0-75E4-43BB-A6A6-84C2A96BDB82}" type="datetimeFigureOut">
               <a:rPr lang="it-IT" smtClean="0"/>
               <a:pPr/>
-              <a:t>28/12/2012</a:t>
+              <a:t>30/12/2012</a:t>
             </a:fld>
             <a:endParaRPr lang="it-IT"/>
           </a:p>
@@ -2721,7 +2766,7 @@
             <a:fld id="{63CABBC0-75E4-43BB-A6A6-84C2A96BDB82}" type="datetimeFigureOut">
               <a:rPr lang="it-IT" smtClean="0"/>
               <a:pPr/>
-              <a:t>28/12/2012</a:t>
+              <a:t>30/12/2012</a:t>
             </a:fld>
             <a:endParaRPr lang="it-IT"/>
           </a:p>
@@ -3018,7 +3063,7 @@
             <a:fld id="{63CABBC0-75E4-43BB-A6A6-84C2A96BDB82}" type="datetimeFigureOut">
               <a:rPr lang="it-IT" smtClean="0"/>
               <a:pPr/>
-              <a:t>28/12/2012</a:t>
+              <a:t>30/12/2012</a:t>
             </a:fld>
             <a:endParaRPr lang="it-IT"/>
           </a:p>
@@ -3798,7 +3843,7 @@
             <a:fld id="{63CABBC0-75E4-43BB-A6A6-84C2A96BDB82}" type="datetimeFigureOut">
               <a:rPr lang="it-IT" smtClean="0"/>
               <a:pPr/>
-              <a:t>28/12/2012</a:t>
+              <a:t>30/12/2012</a:t>
             </a:fld>
             <a:endParaRPr lang="it-IT"/>
           </a:p>
@@ -4481,14 +4526,14 @@
           <p:nvPr>
             <p:extLst>
               <p:ext uri="{D42A27DB-BD31-4B8C-83A1-F6EECF244321}">
-                <p14:modId xmlns:p14="http://schemas.microsoft.com/office/powerpoint/2010/main" xmlns="" val="3478576524"/>
+                <p14:modId xmlns="" xmlns:p14="http://schemas.microsoft.com/office/powerpoint/2010/main" val="3478576524"/>
               </p:ext>
             </p:extLst>
           </p:nvPr>
         </p:nvGraphicFramePr>
         <p:xfrm>
-          <a:off x="29313" y="5042215"/>
-          <a:ext cx="2051720" cy="1948117"/>
+          <a:off x="179512" y="5589240"/>
+          <a:ext cx="2051720" cy="1122554"/>
         </p:xfrm>
         <a:graphic>
           <a:graphicData uri="http://schemas.openxmlformats.org/drawingml/2006/table">
@@ -4551,7 +4596,7 @@
                         <a:rPr lang="it-IT" sz="1400" dirty="0" smtClean="0">
                           <a:effectLst/>
                         </a:rPr>
-                        <a:t>..</a:t>
+                        <a:t>Mariella Ferrara</a:t>
                       </a:r>
                       <a:endParaRPr lang="it-IT" sz="1400" dirty="0">
                         <a:effectLst/>
@@ -4576,57 +4621,13 @@
                         <a:rPr lang="it-IT" sz="1400" dirty="0" smtClean="0">
                           <a:effectLst/>
                         </a:rPr>
-                        <a:t>..</a:t>
+                        <a:t>&lt;matricola</a:t>
                       </a:r>
-                      <a:endParaRPr lang="it-IT" sz="1400" dirty="0">
-                        <a:effectLst/>
-                      </a:endParaRPr>
-                    </a:p>
-                  </a:txBody>
-                  <a:tcPr marL="38100" marR="38100" marT="38100" marB="38100"/>
-                </a:tc>
-              </a:tr>
-              <a:tr h="0">
-                <a:tc>
-                  <a:txBody>
-                    <a:bodyPr/>
-                    <a:lstStyle/>
-                    <a:p>
-                      <a:pPr algn="ctr" rtl="0">
-                        <a:lnSpc>
-                          <a:spcPct val="150000"/>
-                        </a:lnSpc>
-                      </a:pPr>
                       <a:r>
-                        <a:rPr lang="it-IT" sz="1400" dirty="0" smtClean="0">
+                        <a:rPr lang="it-IT" sz="1400" baseline="0" dirty="0" smtClean="0">
                           <a:effectLst/>
                         </a:rPr>
-                        <a:t>..</a:t>
-                      </a:r>
-                      <a:endParaRPr lang="it-IT" sz="1400" dirty="0">
-                        <a:effectLst/>
-                      </a:endParaRPr>
-                    </a:p>
-                  </a:txBody>
-                  <a:tcPr marL="38100" marR="38100" marT="38100" marB="38100"/>
-                </a:tc>
-              </a:tr>
-              <a:tr h="0">
-                <a:tc>
-                  <a:txBody>
-                    <a:bodyPr/>
-                    <a:lstStyle/>
-                    <a:p>
-                      <a:pPr algn="ctr" rtl="0">
-                        <a:lnSpc>
-                          <a:spcPct val="150000"/>
-                        </a:lnSpc>
-                      </a:pPr>
-                      <a:r>
-                        <a:rPr lang="it-IT" sz="1400" dirty="0" smtClean="0">
-                          <a:effectLst/>
-                        </a:rPr>
-                        <a:t>..</a:t>
+                        <a:t> qui&gt;</a:t>
                       </a:r>
                       <a:endParaRPr lang="it-IT" sz="1400" dirty="0">
                         <a:effectLst/>
@@ -4649,13 +4650,13 @@
           <p:nvPr>
             <p:extLst>
               <p:ext uri="{D42A27DB-BD31-4B8C-83A1-F6EECF244321}">
-                <p14:modId xmlns:p14="http://schemas.microsoft.com/office/powerpoint/2010/main" xmlns="" val="3696521689"/>
+                <p14:modId xmlns="" xmlns:p14="http://schemas.microsoft.com/office/powerpoint/2010/main" val="3696521689"/>
               </p:ext>
             </p:extLst>
           </p:nvPr>
         </p:nvGraphicFramePr>
         <p:xfrm>
-          <a:off x="7092280" y="6060793"/>
+          <a:off x="6948264" y="5877272"/>
           <a:ext cx="2051720" cy="792480"/>
         </p:xfrm>
         <a:graphic>
@@ -4739,7 +4740,7 @@
           <a:blip r:embed="rId2" cstate="print">
             <a:extLst>
               <a:ext uri="{28A0092B-C50C-407E-A947-70E740481C1C}">
-                <a14:useLocalDpi xmlns:a14="http://schemas.microsoft.com/office/drawing/2010/main" xmlns="" val="0"/>
+                <a14:useLocalDpi xmlns="" xmlns:a14="http://schemas.microsoft.com/office/drawing/2010/main" val="0"/>
               </a:ext>
             </a:extLst>
           </a:blip>
@@ -4759,7 +4760,7 @@
           <a:noFill/>
           <a:extLst>
             <a:ext uri="{909E8E84-426E-40DD-AFC4-6F175D3DCCD1}">
-              <a14:hiddenFill xmlns:a14="http://schemas.microsoft.com/office/drawing/2010/main" xmlns="">
+              <a14:hiddenFill xmlns="" xmlns:a14="http://schemas.microsoft.com/office/drawing/2010/main">
                 <a:solidFill>
                   <a:srgbClr val="FFFFFF"/>
                 </a:solidFill>
@@ -4771,7 +4772,7 @@
     </p:spTree>
     <p:extLst>
       <p:ext uri="{BB962C8B-B14F-4D97-AF65-F5344CB8AC3E}">
-        <p14:creationId xmlns:p14="http://schemas.microsoft.com/office/powerpoint/2010/main" xmlns="" val="4165334171"/>
+        <p14:creationId xmlns="" xmlns:p14="http://schemas.microsoft.com/office/powerpoint/2010/main" val="4165334171"/>
       </p:ext>
     </p:extLst>
   </p:cSld>
@@ -4852,9 +4853,6 @@
               </a:rPr>
               <a:t> effettuato su KIDS</a:t>
             </a:r>
-            <a:endParaRPr lang="it-IT" sz="2800" b="1" dirty="0" smtClean="0">
-              <a:latin typeface="+mj-lt"/>
-            </a:endParaRPr>
           </a:p>
           <a:p>
             <a:pPr algn="ctr"/>
@@ -5455,7 +5453,7 @@
     </p:spTree>
     <p:extLst>
       <p:ext uri="{BB962C8B-B14F-4D97-AF65-F5344CB8AC3E}">
-        <p14:creationId xmlns:p14="http://schemas.microsoft.com/office/powerpoint/2010/main" xmlns="" val="155874689"/>
+        <p14:creationId xmlns="" xmlns:p14="http://schemas.microsoft.com/office/powerpoint/2010/main" val="155874689"/>
       </p:ext>
     </p:extLst>
   </p:cSld>
@@ -5463,7 +5461,7 @@
     <a:masterClrMapping/>
   </p:clrMapOvr>
   <mc:AlternateContent xmlns:mc="http://schemas.openxmlformats.org/markup-compatibility/2006">
-    <mc:Choice xmlns:p14="http://schemas.microsoft.com/office/powerpoint/2010/main" xmlns="" Requires="p14">
+    <mc:Choice xmlns="" xmlns:p14="http://schemas.microsoft.com/office/powerpoint/2010/main" Requires="p14">
       <p:transition spd="slow" p14:dur="2000"/>
     </mc:Choice>
     <mc:Fallback>
@@ -5680,15 +5678,7 @@
             <a:pPr marL="0" indent="0"/>
             <a:r>
               <a:rPr lang="it-IT" dirty="0" smtClean="0"/>
-              <a:t> Visto il </a:t>
-            </a:r>
-            <a:r>
-              <a:rPr lang="it-IT" dirty="0" smtClean="0"/>
-              <a:t>poco </a:t>
-            </a:r>
-            <a:r>
-              <a:rPr lang="it-IT" dirty="0" smtClean="0"/>
-              <a:t>tempo a disposizione, ed essendo forniti soltanto di una versione imparziale del sistema, non è stato possibile individuare test case basandosi esclusivamente sul </a:t>
+              <a:t> Visto il poco tempo a disposizione, ed essendo forniti soltanto di una versione imparziale del sistema, non è stato possibile individuare test case basandosi esclusivamente sul </a:t>
             </a:r>
             <a:r>
               <a:rPr lang="it-IT" dirty="0" err="1" smtClean="0"/>
@@ -5739,12 +5729,8 @@
               <a:t>, come previsto </a:t>
             </a:r>
             <a:r>
-              <a:rPr lang="it-IT" dirty="0" err="1" smtClean="0"/>
-              <a:t>dalTest</a:t>
-            </a:r>
-            <a:r>
               <a:rPr lang="it-IT" dirty="0" smtClean="0"/>
-              <a:t> </a:t>
+              <a:t>dal Test </a:t>
             </a:r>
             <a:r>
               <a:rPr lang="it-IT" dirty="0" err="1" smtClean="0"/>
@@ -5861,7 +5847,6 @@
               <a:rPr lang="it-IT" sz="2800" b="1" dirty="0" smtClean="0"/>
               <a:t>Esempio di Test Case</a:t>
             </a:r>
-            <a:endParaRPr lang="it-IT" sz="2800" b="1" dirty="0" smtClean="0"/>
           </a:p>
         </p:txBody>
       </p:sp>
@@ -6114,22 +6099,14 @@
             <a:pPr marL="0" indent="0"/>
             <a:r>
               <a:rPr lang="it-IT" dirty="0" smtClean="0"/>
-              <a:t> </a:t>
-            </a:r>
+              <a:t> Diverse incongruenze tra documentazione fornita e sistema implementato hanno reso difficile:</a:t>
+            </a:r>
+          </a:p>
+          <a:p>
+            <a:pPr marL="365760" lvl="1" indent="0"/>
             <a:r>
               <a:rPr lang="it-IT" dirty="0" smtClean="0"/>
-              <a:t>Diverse incongruenze tra documentazione fornita e sistema implementato hanno reso difficile:</a:t>
-            </a:r>
-          </a:p>
-          <a:p>
-            <a:pPr marL="365760" lvl="1" indent="0"/>
-            <a:r>
-              <a:rPr lang="it-IT" dirty="0" smtClean="0"/>
-              <a:t> </a:t>
-            </a:r>
-            <a:r>
-              <a:rPr lang="it-IT" dirty="0" smtClean="0"/>
-              <a:t>l’organizzazione della fase di </a:t>
+              <a:t> l’organizzazione della fase di </a:t>
             </a:r>
             <a:r>
               <a:rPr lang="it-IT" dirty="0" err="1" smtClean="0"/>
@@ -6144,11 +6121,7 @@
             <a:pPr marL="365760" lvl="1" indent="0"/>
             <a:r>
               <a:rPr lang="it-IT" dirty="0" smtClean="0"/>
-              <a:t> la comprensione della documentazione e del  funzionamento del sistema stesso;</a:t>
-            </a:r>
-            <a:r>
-              <a:rPr lang="it-IT" dirty="0" smtClean="0"/>
-              <a:t>	</a:t>
+              <a:t> la comprensione della documentazione e del  funzionamento del sistema stesso;	</a:t>
             </a:r>
           </a:p>
           <a:p>
@@ -6171,7 +6144,6 @@
               <a:rPr lang="it-IT" dirty="0" smtClean="0"/>
               <a:t> specificati sono diventati inutili, in quanto funzionalità non implementate o non coerenti con la documentazione			</a:t>
             </a:r>
-            <a:endParaRPr lang="it-IT" dirty="0" smtClean="0"/>
           </a:p>
         </p:txBody>
       </p:sp>
@@ -6236,9 +6208,6 @@
               </a:rPr>
               <a:t>Decomposizione in sottosistemi</a:t>
             </a:r>
-            <a:endParaRPr lang="it-IT" sz="4800" b="1" dirty="0" smtClean="0">
-              <a:latin typeface="+mj-lt"/>
-            </a:endParaRPr>
           </a:p>
           <a:p>
             <a:pPr algn="ctr"/>
@@ -6443,7 +6412,6 @@
               <a:rPr lang="it-IT" sz="2400" dirty="0" smtClean="0"/>
               <a:t> :</a:t>
             </a:r>
-            <a:endParaRPr lang="it-IT" sz="2400" dirty="0" smtClean="0"/>
           </a:p>
           <a:p>
             <a:pPr marL="514350" indent="-514350">
@@ -6476,7 +6444,6 @@
               <a:rPr lang="it-IT" sz="2400" dirty="0" smtClean="0"/>
               <a:t>: si occupa della gestione della logica applicativa del sistema;</a:t>
             </a:r>
-            <a:endParaRPr lang="it-IT" sz="2400" dirty="0" smtClean="0"/>
           </a:p>
           <a:p>
             <a:pPr marL="514350" indent="-514350">
@@ -6548,7 +6515,7 @@
     </p:spTree>
     <p:extLst>
       <p:ext uri="{BB962C8B-B14F-4D97-AF65-F5344CB8AC3E}">
-        <p14:creationId xmlns:p14="http://schemas.microsoft.com/office/powerpoint/2010/main" xmlns="" val="155874689"/>
+        <p14:creationId xmlns="" xmlns:p14="http://schemas.microsoft.com/office/powerpoint/2010/main" val="155874689"/>
       </p:ext>
     </p:extLst>
   </p:cSld>
@@ -6556,7 +6523,7 @@
     <a:masterClrMapping/>
   </p:clrMapOvr>
   <mc:AlternateContent xmlns:mc="http://schemas.openxmlformats.org/markup-compatibility/2006">
-    <mc:Choice xmlns:p14="http://schemas.microsoft.com/office/powerpoint/2010/main" xmlns="" Requires="p14">
+    <mc:Choice xmlns="" xmlns:p14="http://schemas.microsoft.com/office/powerpoint/2010/main" Requires="p14">
       <p:transition spd="slow" p14:dur="2000"/>
     </mc:Choice>
     <mc:Fallback>
@@ -6822,11 +6789,7 @@
             </a:pPr>
             <a:r>
               <a:rPr lang="it-IT" sz="2600" i="1" smtClean="0"/>
-              <a:t>Application </a:t>
-            </a:r>
-            <a:r>
-              <a:rPr lang="it-IT" sz="2600" i="1" smtClean="0"/>
-              <a:t>(</a:t>
+              <a:t>Application (</a:t>
             </a:r>
             <a:r>
               <a:rPr lang="it-IT" sz="2600" smtClean="0"/>
@@ -6834,11 +6797,7 @@
             </a:r>
             <a:r>
               <a:rPr lang="it-IT" sz="2600" i="1" smtClean="0"/>
-              <a:t>Presentation</a:t>
-            </a:r>
-            <a:r>
-              <a:rPr lang="it-IT" sz="2600" i="1" smtClean="0"/>
-              <a:t>) </a:t>
+              <a:t>Presentation) </a:t>
             </a:r>
             <a:r>
               <a:rPr lang="it-IT" sz="2600" smtClean="0"/>
@@ -6850,13 +6809,8 @@
             </a:r>
             <a:r>
               <a:rPr lang="it-IT" sz="2600" smtClean="0"/>
-              <a:t> </a:t>
-            </a:r>
-            <a:r>
-              <a:rPr lang="it-IT" sz="2600" smtClean="0"/>
-              <a:t>livelli</a:t>
-            </a:r>
-            <a:endParaRPr lang="it-IT" sz="2600" smtClean="0"/>
+              <a:t> livelli</a:t>
+            </a:r>
           </a:p>
         </p:txBody>
       </p:sp>
@@ -7735,28 +7689,15 @@
             </a:r>
             <a:r>
               <a:rPr lang="it-IT" sz="2600" smtClean="0"/>
-              <a:t> livello trovavamo 3 macro </a:t>
-            </a:r>
-            <a:r>
-              <a:rPr lang="it-IT" sz="2600" smtClean="0"/>
-              <a:t>Gestioni</a:t>
-            </a:r>
-            <a:r>
-              <a:rPr lang="it-IT" sz="2600" smtClean="0"/>
-              <a:t>, che ricordavano la divisione nei vari </a:t>
-            </a:r>
-            <a:r>
-              <a:rPr lang="it-IT" sz="2600" smtClean="0"/>
-              <a:t>team</a:t>
-            </a:r>
-            <a:endParaRPr lang="it-IT" sz="2600" smtClean="0"/>
+              <a:t> livello trovavamo 3 macro Gestioni, che ricordavano la divisione nei vari team</a:t>
+            </a:r>
           </a:p>
         </p:txBody>
       </p:sp>
     </p:spTree>
     <p:extLst>
       <p:ext uri="{BB962C8B-B14F-4D97-AF65-F5344CB8AC3E}">
-        <p14:creationId xmlns:p14="http://schemas.microsoft.com/office/powerpoint/2010/main" xmlns="" val="155874689"/>
+        <p14:creationId xmlns="" xmlns:p14="http://schemas.microsoft.com/office/powerpoint/2010/main" val="155874689"/>
       </p:ext>
     </p:extLst>
   </p:cSld>
@@ -7764,7 +7705,7 @@
     <a:masterClrMapping/>
   </p:clrMapOvr>
   <mc:AlternateContent xmlns:mc="http://schemas.openxmlformats.org/markup-compatibility/2006">
-    <mc:Choice xmlns:p14="http://schemas.microsoft.com/office/powerpoint/2010/main" xmlns="" Requires="p14">
+    <mc:Choice xmlns="" xmlns:p14="http://schemas.microsoft.com/office/powerpoint/2010/main" Requires="p14">
       <p:transition spd="slow" p14:dur="2000"/>
     </mc:Choice>
     <mc:Fallback>
@@ -8574,7 +8515,7 @@
     </p:spTree>
     <p:extLst>
       <p:ext uri="{BB962C8B-B14F-4D97-AF65-F5344CB8AC3E}">
-        <p14:creationId xmlns:p14="http://schemas.microsoft.com/office/powerpoint/2010/main" xmlns="" val="155874689"/>
+        <p14:creationId xmlns="" xmlns:p14="http://schemas.microsoft.com/office/powerpoint/2010/main" val="155874689"/>
       </p:ext>
     </p:extLst>
   </p:cSld>
@@ -8582,7 +8523,7 @@
     <a:masterClrMapping/>
   </p:clrMapOvr>
   <mc:AlternateContent xmlns:mc="http://schemas.openxmlformats.org/markup-compatibility/2006">
-    <mc:Choice xmlns:p14="http://schemas.microsoft.com/office/powerpoint/2010/main" xmlns="" Requires="p14">
+    <mc:Choice xmlns="" xmlns:p14="http://schemas.microsoft.com/office/powerpoint/2010/main" Requires="p14">
       <p:transition spd="slow" p14:dur="2000"/>
     </mc:Choice>
     <mc:Fallback>
@@ -8856,7 +8797,7 @@
     </p:spTree>
     <p:extLst>
       <p:ext uri="{BB962C8B-B14F-4D97-AF65-F5344CB8AC3E}">
-        <p14:creationId xmlns:p14="http://schemas.microsoft.com/office/powerpoint/2010/main" xmlns="" val="155874689"/>
+        <p14:creationId xmlns="" xmlns:p14="http://schemas.microsoft.com/office/powerpoint/2010/main" val="155874689"/>
       </p:ext>
     </p:extLst>
   </p:cSld>
@@ -8864,7 +8805,7 @@
     <a:masterClrMapping/>
   </p:clrMapOvr>
   <mc:AlternateContent xmlns:mc="http://schemas.openxmlformats.org/markup-compatibility/2006">
-    <mc:Choice xmlns:p14="http://schemas.microsoft.com/office/powerpoint/2010/main" xmlns="" Requires="p14">
+    <mc:Choice xmlns="" xmlns:p14="http://schemas.microsoft.com/office/powerpoint/2010/main" Requires="p14">
       <p:transition spd="slow" p14:dur="2000"/>
     </mc:Choice>
     <mc:Fallback>
@@ -8983,7 +8924,6 @@
               <a:rPr lang="it-IT" sz="2800" b="1" dirty="0" smtClean="0"/>
               <a:t>Cosa non andava bene?</a:t>
             </a:r>
-            <a:endParaRPr lang="it-IT" sz="2800" b="1" dirty="0" smtClean="0"/>
           </a:p>
         </p:txBody>
       </p:sp>
@@ -9197,7 +9137,6 @@
               <a:rPr lang="it-IT" dirty="0" smtClean="0"/>
               <a:t> Suddivisione troppo astratta</a:t>
             </a:r>
-            <a:endParaRPr lang="it-IT" dirty="0" smtClean="0"/>
           </a:p>
           <a:p>
             <a:pPr lvl="1"/>
@@ -9403,13 +9342,8 @@
             </a:pPr>
             <a:r>
               <a:rPr lang="it-IT" dirty="0" smtClean="0"/>
-              <a:t>  Bassa coesione nella suddivisione di primo </a:t>
-            </a:r>
-            <a:r>
-              <a:rPr lang="it-IT" dirty="0" smtClean="0"/>
-              <a:t>livello</a:t>
-            </a:r>
-            <a:endParaRPr lang="it-IT" dirty="0" smtClean="0"/>
+              <a:t>  Bassa coesione nella suddivisione di primo livello</a:t>
+            </a:r>
           </a:p>
         </p:txBody>
       </p:sp>
@@ -9918,11 +9852,7 @@
             </a:r>
             <a:r>
               <a:rPr lang="it-IT" sz="2200" dirty="0" err="1" smtClean="0"/>
-              <a:t>Gestione</a:t>
-            </a:r>
-            <a:r>
-              <a:rPr lang="it-IT" sz="2200" dirty="0" err="1" smtClean="0"/>
-              <a:t>Registro</a:t>
+              <a:t>GestioneRegistro</a:t>
             </a:r>
             <a:endParaRPr lang="it-IT" sz="2200" dirty="0" smtClean="0"/>
           </a:p>
@@ -9949,7 +9879,7 @@
     </p:spTree>
     <p:extLst>
       <p:ext uri="{BB962C8B-B14F-4D97-AF65-F5344CB8AC3E}">
-        <p14:creationId xmlns:p14="http://schemas.microsoft.com/office/powerpoint/2010/main" xmlns="" val="155874689"/>
+        <p14:creationId xmlns="" xmlns:p14="http://schemas.microsoft.com/office/powerpoint/2010/main" val="155874689"/>
       </p:ext>
     </p:extLst>
   </p:cSld>
@@ -9957,7 +9887,7 @@
     <a:masterClrMapping/>
   </p:clrMapOvr>
   <mc:AlternateContent xmlns:mc="http://schemas.openxmlformats.org/markup-compatibility/2006">
-    <mc:Choice xmlns:p14="http://schemas.microsoft.com/office/powerpoint/2010/main" xmlns="" Requires="p14">
+    <mc:Choice xmlns="" xmlns:p14="http://schemas.microsoft.com/office/powerpoint/2010/main" Requires="p14">
       <p:transition spd="slow" p14:dur="2000"/>
     </mc:Choice>
     <mc:Fallback>
@@ -10093,7 +10023,6 @@
               <a:rPr lang="it-IT" sz="2800" b="1" dirty="0" smtClean="0"/>
               <a:t>Risultati ottenuti con la seconda versione</a:t>
             </a:r>
-            <a:endParaRPr lang="it-IT" sz="2800" b="1" dirty="0" smtClean="0"/>
           </a:p>
         </p:txBody>
       </p:sp>
@@ -10312,17 +10241,12 @@
               <a:rPr lang="it-IT" dirty="0" smtClean="0"/>
               <a:t>Decomposizione più funzionale e maggiore visibilità, raggiunta tramite sottosistemi di più piccole dimensioni</a:t>
             </a:r>
-            <a:endParaRPr lang="it-IT" dirty="0" smtClean="0"/>
           </a:p>
           <a:p>
             <a:pPr lvl="1"/>
             <a:r>
               <a:rPr lang="it-IT" i="1" dirty="0" smtClean="0"/>
-              <a:t>I sottosistemi sono più indipendenti l’uno </a:t>
-            </a:r>
-            <a:r>
-              <a:rPr lang="it-IT" i="1" dirty="0" smtClean="0"/>
-              <a:t>dall’altro</a:t>
+              <a:t>I sottosistemi sono più indipendenti l’uno dall’altro</a:t>
             </a:r>
           </a:p>
           <a:p>
@@ -10345,7 +10269,7 @@
     </p:spTree>
     <p:extLst>
       <p:ext uri="{BB962C8B-B14F-4D97-AF65-F5344CB8AC3E}">
-        <p14:creationId xmlns:p14="http://schemas.microsoft.com/office/powerpoint/2010/main" xmlns="" val="155874689"/>
+        <p14:creationId xmlns="" xmlns:p14="http://schemas.microsoft.com/office/powerpoint/2010/main" val="155874689"/>
       </p:ext>
     </p:extLst>
   </p:cSld>
@@ -10353,7 +10277,7 @@
     <a:masterClrMapping/>
   </p:clrMapOvr>
   <mc:AlternateContent xmlns:mc="http://schemas.openxmlformats.org/markup-compatibility/2006">
-    <mc:Choice xmlns:p14="http://schemas.microsoft.com/office/powerpoint/2010/main" xmlns="" Requires="p14">
+    <mc:Choice xmlns="" xmlns:p14="http://schemas.microsoft.com/office/powerpoint/2010/main" Requires="p14">
       <p:transition spd="slow" p14:dur="2000"/>
     </mc:Choice>
     <mc:Fallback>
@@ -11071,7 +10995,7 @@
     </p:spTree>
     <p:extLst>
       <p:ext uri="{BB962C8B-B14F-4D97-AF65-F5344CB8AC3E}">
-        <p14:creationId xmlns:p14="http://schemas.microsoft.com/office/powerpoint/2010/main" xmlns="" val="155874689"/>
+        <p14:creationId xmlns="" xmlns:p14="http://schemas.microsoft.com/office/powerpoint/2010/main" val="155874689"/>
       </p:ext>
     </p:extLst>
   </p:cSld>
@@ -11079,7 +11003,7 @@
     <a:masterClrMapping/>
   </p:clrMapOvr>
   <mc:AlternateContent xmlns:mc="http://schemas.openxmlformats.org/markup-compatibility/2006">
-    <mc:Choice xmlns:p14="http://schemas.microsoft.com/office/powerpoint/2010/main" xmlns="" Requires="p14">
+    <mc:Choice xmlns="" xmlns:p14="http://schemas.microsoft.com/office/powerpoint/2010/main" Requires="p14">
       <p:transition spd="slow" p14:dur="2000"/>
     </mc:Choice>
     <mc:Fallback>

</xml_diff>